<commit_message>
Update DATA604  final project with narration .pptx
Updated narration
</commit_message>
<xml_diff>
--- a/DATA604  final project with narration .pptx
+++ b/DATA604  final project with narration .pptx
@@ -6245,10 +6245,10 @@
   </p:clrMapOvr>
   <mc:AlternateContent xmlns:mc="http://schemas.openxmlformats.org/markup-compatibility/2006">
     <mc:Choice xmlns:p14="http://schemas.microsoft.com/office/powerpoint/2010/main" Requires="p14">
-      <p:transition spd="slow" p14:dur="2000" advTm="6862"/>
+      <p:transition spd="slow" p14:dur="2000" advTm="13415"/>
     </mc:Choice>
     <mc:Fallback>
-      <p:transition spd="slow" advTm="6862"/>
+      <p:transition spd="slow" advTm="13415"/>
     </mc:Fallback>
   </mc:AlternateContent>
   <p:timing>
@@ -6455,6 +6455,14 @@
   <p:clrMapOvr>
     <a:masterClrMapping/>
   </p:clrMapOvr>
+  <mc:AlternateContent xmlns:mc="http://schemas.openxmlformats.org/markup-compatibility/2006">
+    <mc:Choice xmlns:p14="http://schemas.microsoft.com/office/powerpoint/2010/main" Requires="p14">
+      <p:transition spd="slow" p14:dur="2000" advTm="64494"/>
+    </mc:Choice>
+    <mc:Fallback>
+      <p:transition spd="slow" advTm="64494"/>
+    </mc:Fallback>
+  </mc:AlternateContent>
 </p:sld>
 </file>
 
@@ -6532,6 +6540,14 @@
   <p:clrMapOvr>
     <a:masterClrMapping/>
   </p:clrMapOvr>
+  <mc:AlternateContent xmlns:mc="http://schemas.openxmlformats.org/markup-compatibility/2006">
+    <mc:Choice xmlns:p14="http://schemas.microsoft.com/office/powerpoint/2010/main" Requires="p14">
+      <p:transition spd="slow" p14:dur="2000" advTm="5501"/>
+    </mc:Choice>
+    <mc:Fallback>
+      <p:transition spd="slow" advTm="5501"/>
+    </mc:Fallback>
+  </mc:AlternateContent>
 </p:sld>
 </file>
 
@@ -6713,10 +6729,10 @@
   </p:clrMapOvr>
   <mc:AlternateContent xmlns:mc="http://schemas.openxmlformats.org/markup-compatibility/2006">
     <mc:Choice xmlns:p14="http://schemas.microsoft.com/office/powerpoint/2010/main" Requires="p14">
-      <p:transition spd="slow" p14:dur="2000" advTm="2234"/>
+      <p:transition spd="slow" p14:dur="2000" advTm="37362"/>
     </mc:Choice>
     <mc:Fallback>
-      <p:transition spd="slow" advTm="2234"/>
+      <p:transition spd="slow" advTm="37362"/>
     </mc:Fallback>
   </mc:AlternateContent>
   <p:timing>
@@ -6926,10 +6942,10 @@
   </p:clrMapOvr>
   <mc:AlternateContent xmlns:mc="http://schemas.openxmlformats.org/markup-compatibility/2006">
     <mc:Choice xmlns:p14="http://schemas.microsoft.com/office/powerpoint/2010/main" Requires="p14">
-      <p:transition spd="slow" p14:dur="2000" advTm="1638"/>
+      <p:transition spd="slow" p14:dur="2000" advTm="9629"/>
     </mc:Choice>
     <mc:Fallback>
-      <p:transition spd="slow" advTm="1638"/>
+      <p:transition spd="slow" advTm="9629"/>
     </mc:Fallback>
   </mc:AlternateContent>
   <p:timing>
@@ -7167,10 +7183,10 @@
   </p:clrMapOvr>
   <mc:AlternateContent xmlns:mc="http://schemas.openxmlformats.org/markup-compatibility/2006">
     <mc:Choice xmlns:p14="http://schemas.microsoft.com/office/powerpoint/2010/main" Requires="p14">
-      <p:transition spd="slow" p14:dur="2000" advTm="448"/>
+      <p:transition spd="slow" p14:dur="2000" advTm="32795"/>
     </mc:Choice>
     <mc:Fallback>
-      <p:transition spd="slow" advTm="448"/>
+      <p:transition spd="slow" advTm="32795"/>
     </mc:Fallback>
   </mc:AlternateContent>
   <p:timing>
@@ -7396,10 +7412,10 @@
   </p:clrMapOvr>
   <mc:AlternateContent xmlns:mc="http://schemas.openxmlformats.org/markup-compatibility/2006">
     <mc:Choice xmlns:p14="http://schemas.microsoft.com/office/powerpoint/2010/main" Requires="p14">
-      <p:transition spd="slow" p14:dur="2000" advTm="1095"/>
+      <p:transition spd="slow" p14:dur="2000" advTm="35999"/>
     </mc:Choice>
     <mc:Fallback>
-      <p:transition spd="slow" advTm="1095"/>
+      <p:transition spd="slow" advTm="35999"/>
     </mc:Fallback>
   </mc:AlternateContent>
   <p:timing>
@@ -7587,10 +7603,10 @@
   </p:clrMapOvr>
   <mc:AlternateContent xmlns:mc="http://schemas.openxmlformats.org/markup-compatibility/2006">
     <mc:Choice xmlns:p14="http://schemas.microsoft.com/office/powerpoint/2010/main" Requires="p14">
-      <p:transition spd="slow" p14:dur="2000" advTm="0"/>
+      <p:transition spd="slow" p14:dur="2000" advTm="21720"/>
     </mc:Choice>
     <mc:Fallback>
-      <p:transition spd="slow" advTm="0"/>
+      <p:transition spd="slow" advTm="21720"/>
     </mc:Fallback>
   </mc:AlternateContent>
 </p:sld>
@@ -7695,6 +7711,14 @@
   <p:clrMapOvr>
     <a:masterClrMapping/>
   </p:clrMapOvr>
+  <mc:AlternateContent xmlns:mc="http://schemas.openxmlformats.org/markup-compatibility/2006">
+    <mc:Choice xmlns:p14="http://schemas.microsoft.com/office/powerpoint/2010/main" Requires="p14">
+      <p:transition spd="slow" p14:dur="2000" advTm="11270"/>
+    </mc:Choice>
+    <mc:Fallback>
+      <p:transition spd="slow" advTm="11270"/>
+    </mc:Fallback>
+  </mc:AlternateContent>
 </p:sld>
 </file>
 
@@ -7932,6 +7956,14 @@
   <p:clrMapOvr>
     <a:masterClrMapping/>
   </p:clrMapOvr>
+  <mc:AlternateContent xmlns:mc="http://schemas.openxmlformats.org/markup-compatibility/2006">
+    <mc:Choice xmlns:p14="http://schemas.microsoft.com/office/powerpoint/2010/main" Requires="p14">
+      <p:transition spd="slow" p14:dur="2000" advTm="23894"/>
+    </mc:Choice>
+    <mc:Fallback>
+      <p:transition spd="slow" advTm="23894"/>
+    </mc:Fallback>
+  </mc:AlternateContent>
   <p:timing>
     <p:tnLst>
       <p:par>
@@ -8092,12 +8124,20 @@
   <p:clrMapOvr>
     <a:masterClrMapping/>
   </p:clrMapOvr>
+  <mc:AlternateContent xmlns:mc="http://schemas.openxmlformats.org/markup-compatibility/2006">
+    <mc:Choice xmlns:p14="http://schemas.microsoft.com/office/powerpoint/2010/main" Requires="p14">
+      <p:transition spd="slow" p14:dur="2000" advTm="33419"/>
+    </mc:Choice>
+    <mc:Fallback>
+      <p:transition spd="slow" advTm="33419"/>
+    </mc:Fallback>
+  </mc:AlternateContent>
 </p:sld>
 </file>
 
 <file path=ppt/tags/tag1.xml><?xml version="1.0" encoding="utf-8"?>
 <p:tagLst xmlns:a="http://schemas.openxmlformats.org/drawingml/2006/main" xmlns:r="http://schemas.openxmlformats.org/officeDocument/2006/relationships" xmlns:p="http://schemas.openxmlformats.org/presentationml/2006/main">
-  <p:tag name="TIMING" val="|15.8"/>
+  <p:tag name="TIMING" val="|4.2"/>
 </p:tagLst>
 </file>
 
@@ -8667,14 +8707,6 @@
 </file>
 
 <file path=customXml/item2.xml><?xml version="1.0" encoding="utf-8"?>
-<p:properties xmlns:p="http://schemas.microsoft.com/office/2006/metadata/properties" xmlns:xsi="http://www.w3.org/2001/XMLSchema-instance" xmlns:pc="http://schemas.microsoft.com/office/infopath/2007/PartnerControls">
-  <documentManagement>
-    <MediaServiceKeyPoints xmlns="71af3243-3dd4-4a8d-8c0d-dd76da1f02a5" xsi:nil="true"/>
-  </documentManagement>
-</p:properties>
-</file>
-
-<file path=customXml/item3.xml><?xml version="1.0" encoding="utf-8"?>
 <ct:contentTypeSchema xmlns:ct="http://schemas.microsoft.com/office/2006/metadata/contentType" xmlns:ma="http://schemas.microsoft.com/office/2006/metadata/properties/metaAttributes" ct:_="" ma:_="" ma:contentTypeName="Document" ma:contentTypeID="0x01010079F111ED35F8CC479449609E8A0923A6" ma:contentTypeVersion="11" ma:contentTypeDescription="Create a new document." ma:contentTypeScope="" ma:versionID="9677210f24a1be23c92c90fd886aa0aa">
   <xsd:schema xmlns:xsd="http://www.w3.org/2001/XMLSchema" xmlns:xs="http://www.w3.org/2001/XMLSchema" xmlns:p="http://schemas.microsoft.com/office/2006/metadata/properties" xmlns:ns2="71af3243-3dd4-4a8d-8c0d-dd76da1f02a5" xmlns:ns3="16c05727-aa75-4e4a-9b5f-8a80a1165891" targetNamespace="http://schemas.microsoft.com/office/2006/metadata/properties" ma:root="true" ma:fieldsID="60e05723c5c1908df1a1a4ebf11d344e" ns2:_="" ns3:_="">
     <xsd:import namespace="71af3243-3dd4-4a8d-8c0d-dd76da1f02a5"/>
@@ -8885,6 +8917,14 @@
 </ct:contentTypeSchema>
 </file>
 
+<file path=customXml/item3.xml><?xml version="1.0" encoding="utf-8"?>
+<p:properties xmlns:p="http://schemas.microsoft.com/office/2006/metadata/properties" xmlns:xsi="http://www.w3.org/2001/XMLSchema-instance" xmlns:pc="http://schemas.microsoft.com/office/infopath/2007/PartnerControls">
+  <documentManagement>
+    <MediaServiceKeyPoints xmlns="71af3243-3dd4-4a8d-8c0d-dd76da1f02a5" xsi:nil="true"/>
+  </documentManagement>
+</p:properties>
+</file>
+
 <file path=customXml/itemProps1.xml><?xml version="1.0" encoding="utf-8"?>
 <ds:datastoreItem xmlns:ds="http://schemas.openxmlformats.org/officeDocument/2006/customXml" ds:itemID="{E76CE1C2-24FF-4125-B61C-AD39973FCD09}">
   <ds:schemaRefs>
@@ -8894,23 +8934,6 @@
 </file>
 
 <file path=customXml/itemProps2.xml><?xml version="1.0" encoding="utf-8"?>
-<ds:datastoreItem xmlns:ds="http://schemas.openxmlformats.org/officeDocument/2006/customXml" ds:itemID="{5AF23494-F630-4E01-81EA-AA2F2975971E}">
-  <ds:schemaRefs>
-    <ds:schemaRef ds:uri="http://purl.org/dc/elements/1.1/"/>
-    <ds:schemaRef ds:uri="http://schemas.microsoft.com/office/2006/metadata/properties"/>
-    <ds:schemaRef ds:uri="16c05727-aa75-4e4a-9b5f-8a80a1165891"/>
-    <ds:schemaRef ds:uri="http://schemas.microsoft.com/office/infopath/2007/PartnerControls"/>
-    <ds:schemaRef ds:uri="http://purl.org/dc/terms/"/>
-    <ds:schemaRef ds:uri="http://schemas.openxmlformats.org/package/2006/metadata/core-properties"/>
-    <ds:schemaRef ds:uri="http://schemas.microsoft.com/office/2006/documentManagement/types"/>
-    <ds:schemaRef ds:uri="71af3243-3dd4-4a8d-8c0d-dd76da1f02a5"/>
-    <ds:schemaRef ds:uri="http://www.w3.org/XML/1998/namespace"/>
-    <ds:schemaRef ds:uri="http://purl.org/dc/dcmitype/"/>
-  </ds:schemaRefs>
-</ds:datastoreItem>
-</file>
-
-<file path=customXml/itemProps3.xml><?xml version="1.0" encoding="utf-8"?>
 <ds:datastoreItem xmlns:ds="http://schemas.openxmlformats.org/officeDocument/2006/customXml" ds:itemID="{CC083022-B7D0-4DE3-9976-6A91422D94FD}">
   <ds:schemaRefs>
     <ds:schemaRef ds:uri="http://schemas.microsoft.com/office/2006/metadata/contentType"/>
@@ -8927,4 +8950,21 @@
     <ds:schemaRef ds:uri="http://schemas.microsoft.com/internal/obd"/>
   </ds:schemaRefs>
 </ds:datastoreItem>
+</file>
+
+<file path=customXml/itemProps3.xml><?xml version="1.0" encoding="utf-8"?>
+<ds:datastoreItem xmlns:ds="http://schemas.openxmlformats.org/officeDocument/2006/customXml" ds:itemID="{5AF23494-F630-4E01-81EA-AA2F2975971E}">
+  <ds:schemaRefs>
+    <ds:schemaRef ds:uri="http://purl.org/dc/elements/1.1/"/>
+    <ds:schemaRef ds:uri="http://schemas.microsoft.com/office/2006/metadata/properties"/>
+    <ds:schemaRef ds:uri="16c05727-aa75-4e4a-9b5f-8a80a1165891"/>
+    <ds:schemaRef ds:uri="http://schemas.microsoft.com/office/infopath/2007/PartnerControls"/>
+    <ds:schemaRef ds:uri="http://purl.org/dc/terms/"/>
+    <ds:schemaRef ds:uri="http://schemas.openxmlformats.org/package/2006/metadata/core-properties"/>
+    <ds:schemaRef ds:uri="http://schemas.microsoft.com/office/2006/documentManagement/types"/>
+    <ds:schemaRef ds:uri="71af3243-3dd4-4a8d-8c0d-dd76da1f02a5"/>
+    <ds:schemaRef ds:uri="http://www.w3.org/XML/1998/namespace"/>
+    <ds:schemaRef ds:uri="http://purl.org/dc/dcmitype/"/>
+  </ds:schemaRefs>
+</ds:datastoreItem>
 </file>
</xml_diff>